<commit_message>
MEE round 1 revisions
</commit_message>
<xml_diff>
--- a/figures/workflow_schematic_v2.pptx
+++ b/figures/workflow_schematic_v2.pptx
@@ -2,7 +2,7 @@
 <file path=ppt/presentation.xml><?xml version="1.0" encoding="utf-8"?>
 <p:presentation xmlns:a="http://schemas.openxmlformats.org/drawingml/2006/main" xmlns:r="http://schemas.openxmlformats.org/officeDocument/2006/relationships" xmlns:p="http://schemas.openxmlformats.org/presentationml/2006/main" saveSubsetFonts="1" autoCompressPictures="0">
   <p:sldMasterIdLst>
-    <p:sldMasterId id="2147483672" r:id="rId1"/>
+    <p:sldMasterId id="2147483708" r:id="rId1"/>
   </p:sldMasterIdLst>
   <p:notesMasterIdLst>
     <p:notesMasterId r:id="rId3"/>
@@ -10,7 +10,7 @@
   <p:sldIdLst>
     <p:sldId id="256" r:id="rId2"/>
   </p:sldIdLst>
-  <p:sldSz cx="9601200" cy="12801600" type="A3"/>
+  <p:sldSz cx="9601200" cy="12492038"/>
   <p:notesSz cx="6858000" cy="9144000"/>
   <p:defaultTextStyle>
     <a:defPPr>
@@ -197,7 +197,7 @@
           <a:p>
             <a:fld id="{A2F38EE1-39FF-3C40-8041-DAB90002480B}" type="datetimeFigureOut">
               <a:rPr lang="en-US" smtClean="0"/>
-              <a:t>7/30/22</a:t>
+              <a:t>11/19/22</a:t>
             </a:fld>
             <a:endParaRPr lang="en-US"/>
           </a:p>
@@ -215,8 +215,8 @@
         </p:nvSpPr>
         <p:spPr>
           <a:xfrm>
-            <a:off x="2271713" y="1143000"/>
-            <a:ext cx="2314575" cy="3086100"/>
+            <a:off x="2243138" y="1143000"/>
+            <a:ext cx="2371725" cy="3086100"/>
           </a:xfrm>
           <a:prstGeom prst="rect">
             <a:avLst/>
@@ -491,7 +491,12 @@
             <p:ph type="sldImg"/>
           </p:nvPr>
         </p:nvSpPr>
-        <p:spPr/>
+        <p:spPr>
+          <a:xfrm>
+            <a:off x="2243138" y="1143000"/>
+            <a:ext cx="2371725" cy="3086100"/>
+          </a:xfrm>
+        </p:spPr>
       </p:sp>
       <p:sp>
         <p:nvSpPr>
@@ -577,8 +582,8 @@
         </p:nvSpPr>
         <p:spPr>
           <a:xfrm>
-            <a:off x="720090" y="2095078"/>
-            <a:ext cx="8161020" cy="4456853"/>
+            <a:off x="720090" y="2044415"/>
+            <a:ext cx="8161020" cy="4349080"/>
           </a:xfrm>
         </p:spPr>
         <p:txBody>
@@ -609,8 +614,8 @@
         </p:nvSpPr>
         <p:spPr>
           <a:xfrm>
-            <a:off x="1200150" y="6723804"/>
-            <a:ext cx="7200900" cy="3090756"/>
+            <a:off x="1200150" y="6561212"/>
+            <a:ext cx="7200900" cy="3016017"/>
           </a:xfrm>
         </p:spPr>
         <p:txBody>
@@ -679,7 +684,7 @@
           <a:p>
             <a:fld id="{6083BCA8-199F-2240-91E2-4F772E97A851}" type="datetimeFigureOut">
               <a:rPr lang="en-US" smtClean="0"/>
-              <a:t>7/30/22</a:t>
+              <a:t>11/19/22</a:t>
             </a:fld>
             <a:endParaRPr lang="en-US"/>
           </a:p>
@@ -730,7 +735,7 @@
     </p:spTree>
     <p:extLst>
       <p:ext uri="{BB962C8B-B14F-4D97-AF65-F5344CB8AC3E}">
-        <p14:creationId xmlns:p14="http://schemas.microsoft.com/office/powerpoint/2010/main" val="1716789636"/>
+        <p14:creationId xmlns:p14="http://schemas.microsoft.com/office/powerpoint/2010/main" val="2756089619"/>
       </p:ext>
     </p:extLst>
   </p:cSld>
@@ -849,7 +854,7 @@
           <a:p>
             <a:fld id="{6083BCA8-199F-2240-91E2-4F772E97A851}" type="datetimeFigureOut">
               <a:rPr lang="en-US" smtClean="0"/>
-              <a:t>7/30/22</a:t>
+              <a:t>11/19/22</a:t>
             </a:fld>
             <a:endParaRPr lang="en-US"/>
           </a:p>
@@ -900,7 +905,7 @@
     </p:spTree>
     <p:extLst>
       <p:ext uri="{BB962C8B-B14F-4D97-AF65-F5344CB8AC3E}">
-        <p14:creationId xmlns:p14="http://schemas.microsoft.com/office/powerpoint/2010/main" val="2804179701"/>
+        <p14:creationId xmlns:p14="http://schemas.microsoft.com/office/powerpoint/2010/main" val="2014443356"/>
       </p:ext>
     </p:extLst>
   </p:cSld>
@@ -939,8 +944,8 @@
         </p:nvSpPr>
         <p:spPr>
           <a:xfrm>
-            <a:off x="6870859" y="681567"/>
-            <a:ext cx="2070259" cy="10848764"/>
+            <a:off x="6870859" y="665085"/>
+            <a:ext cx="2070259" cy="10586425"/>
           </a:xfrm>
         </p:spPr>
         <p:txBody>
@@ -967,8 +972,8 @@
         </p:nvSpPr>
         <p:spPr>
           <a:xfrm>
-            <a:off x="660083" y="681567"/>
-            <a:ext cx="6090761" cy="10848764"/>
+            <a:off x="660083" y="665085"/>
+            <a:ext cx="6090761" cy="10586425"/>
           </a:xfrm>
         </p:spPr>
         <p:txBody>
@@ -1029,7 +1034,7 @@
           <a:p>
             <a:fld id="{6083BCA8-199F-2240-91E2-4F772E97A851}" type="datetimeFigureOut">
               <a:rPr lang="en-US" smtClean="0"/>
-              <a:t>7/30/22</a:t>
+              <a:t>11/19/22</a:t>
             </a:fld>
             <a:endParaRPr lang="en-US"/>
           </a:p>
@@ -1080,7 +1085,7 @@
     </p:spTree>
     <p:extLst>
       <p:ext uri="{BB962C8B-B14F-4D97-AF65-F5344CB8AC3E}">
-        <p14:creationId xmlns:p14="http://schemas.microsoft.com/office/powerpoint/2010/main" val="3523620499"/>
+        <p14:creationId xmlns:p14="http://schemas.microsoft.com/office/powerpoint/2010/main" val="4158940118"/>
       </p:ext>
     </p:extLst>
   </p:cSld>
@@ -1199,7 +1204,7 @@
           <a:p>
             <a:fld id="{6083BCA8-199F-2240-91E2-4F772E97A851}" type="datetimeFigureOut">
               <a:rPr lang="en-US" smtClean="0"/>
-              <a:t>7/30/22</a:t>
+              <a:t>11/19/22</a:t>
             </a:fld>
             <a:endParaRPr lang="en-US"/>
           </a:p>
@@ -1250,7 +1255,7 @@
     </p:spTree>
     <p:extLst>
       <p:ext uri="{BB962C8B-B14F-4D97-AF65-F5344CB8AC3E}">
-        <p14:creationId xmlns:p14="http://schemas.microsoft.com/office/powerpoint/2010/main" val="3992383966"/>
+        <p14:creationId xmlns:p14="http://schemas.microsoft.com/office/powerpoint/2010/main" val="1446193988"/>
       </p:ext>
     </p:extLst>
   </p:cSld>
@@ -1289,8 +1294,8 @@
         </p:nvSpPr>
         <p:spPr>
           <a:xfrm>
-            <a:off x="655082" y="3191514"/>
-            <a:ext cx="8281035" cy="5325109"/>
+            <a:off x="655082" y="3114338"/>
+            <a:ext cx="8281035" cy="5196340"/>
           </a:xfrm>
         </p:spPr>
         <p:txBody>
@@ -1321,8 +1326,8 @@
         </p:nvSpPr>
         <p:spPr>
           <a:xfrm>
-            <a:off x="655082" y="8567000"/>
-            <a:ext cx="8281035" cy="2800349"/>
+            <a:off x="655082" y="8359838"/>
+            <a:ext cx="8281035" cy="2732632"/>
           </a:xfrm>
         </p:spPr>
         <p:txBody>
@@ -1443,7 +1448,7 @@
           <a:p>
             <a:fld id="{6083BCA8-199F-2240-91E2-4F772E97A851}" type="datetimeFigureOut">
               <a:rPr lang="en-US" smtClean="0"/>
-              <a:t>7/30/22</a:t>
+              <a:t>11/19/22</a:t>
             </a:fld>
             <a:endParaRPr lang="en-US"/>
           </a:p>
@@ -1494,7 +1499,7 @@
     </p:spTree>
     <p:extLst>
       <p:ext uri="{BB962C8B-B14F-4D97-AF65-F5344CB8AC3E}">
-        <p14:creationId xmlns:p14="http://schemas.microsoft.com/office/powerpoint/2010/main" val="875378371"/>
+        <p14:creationId xmlns:p14="http://schemas.microsoft.com/office/powerpoint/2010/main" val="3260770870"/>
       </p:ext>
     </p:extLst>
   </p:cSld>
@@ -1556,8 +1561,8 @@
         </p:nvSpPr>
         <p:spPr>
           <a:xfrm>
-            <a:off x="660083" y="3407833"/>
-            <a:ext cx="4080510" cy="8122498"/>
+            <a:off x="660083" y="3325427"/>
+            <a:ext cx="4080510" cy="7926083"/>
           </a:xfrm>
         </p:spPr>
         <p:txBody>
@@ -1613,8 +1618,8 @@
         </p:nvSpPr>
         <p:spPr>
           <a:xfrm>
-            <a:off x="4860608" y="3407833"/>
-            <a:ext cx="4080510" cy="8122498"/>
+            <a:off x="4860608" y="3325427"/>
+            <a:ext cx="4080510" cy="7926083"/>
           </a:xfrm>
         </p:spPr>
         <p:txBody>
@@ -1675,7 +1680,7 @@
           <a:p>
             <a:fld id="{6083BCA8-199F-2240-91E2-4F772E97A851}" type="datetimeFigureOut">
               <a:rPr lang="en-US" smtClean="0"/>
-              <a:t>7/30/22</a:t>
+              <a:t>11/19/22</a:t>
             </a:fld>
             <a:endParaRPr lang="en-US"/>
           </a:p>
@@ -1726,7 +1731,7 @@
     </p:spTree>
     <p:extLst>
       <p:ext uri="{BB962C8B-B14F-4D97-AF65-F5344CB8AC3E}">
-        <p14:creationId xmlns:p14="http://schemas.microsoft.com/office/powerpoint/2010/main" val="3419369645"/>
+        <p14:creationId xmlns:p14="http://schemas.microsoft.com/office/powerpoint/2010/main" val="329581517"/>
       </p:ext>
     </p:extLst>
   </p:cSld>
@@ -1765,8 +1770,8 @@
         </p:nvSpPr>
         <p:spPr>
           <a:xfrm>
-            <a:off x="661333" y="681570"/>
-            <a:ext cx="8281035" cy="2474384"/>
+            <a:off x="661333" y="665088"/>
+            <a:ext cx="8281035" cy="2414550"/>
           </a:xfrm>
         </p:spPr>
         <p:txBody>
@@ -1793,8 +1798,8 @@
         </p:nvSpPr>
         <p:spPr>
           <a:xfrm>
-            <a:off x="661334" y="3138171"/>
-            <a:ext cx="4061757" cy="1537969"/>
+            <a:off x="661334" y="3062285"/>
+            <a:ext cx="4061757" cy="1500779"/>
           </a:xfrm>
         </p:spPr>
         <p:txBody>
@@ -1858,8 +1863,8 @@
         </p:nvSpPr>
         <p:spPr>
           <a:xfrm>
-            <a:off x="661334" y="4676140"/>
-            <a:ext cx="4061757" cy="6877898"/>
+            <a:off x="661334" y="4563064"/>
+            <a:ext cx="4061757" cy="6711580"/>
           </a:xfrm>
         </p:spPr>
         <p:txBody>
@@ -1915,8 +1920,8 @@
         </p:nvSpPr>
         <p:spPr>
           <a:xfrm>
-            <a:off x="4860608" y="3138171"/>
-            <a:ext cx="4081761" cy="1537969"/>
+            <a:off x="4860608" y="3062285"/>
+            <a:ext cx="4081761" cy="1500779"/>
           </a:xfrm>
         </p:spPr>
         <p:txBody>
@@ -1980,8 +1985,8 @@
         </p:nvSpPr>
         <p:spPr>
           <a:xfrm>
-            <a:off x="4860608" y="4676140"/>
-            <a:ext cx="4081761" cy="6877898"/>
+            <a:off x="4860608" y="4563064"/>
+            <a:ext cx="4081761" cy="6711580"/>
           </a:xfrm>
         </p:spPr>
         <p:txBody>
@@ -2042,7 +2047,7 @@
           <a:p>
             <a:fld id="{6083BCA8-199F-2240-91E2-4F772E97A851}" type="datetimeFigureOut">
               <a:rPr lang="en-US" smtClean="0"/>
-              <a:t>7/30/22</a:t>
+              <a:t>11/19/22</a:t>
             </a:fld>
             <a:endParaRPr lang="en-US"/>
           </a:p>
@@ -2093,7 +2098,7 @@
     </p:spTree>
     <p:extLst>
       <p:ext uri="{BB962C8B-B14F-4D97-AF65-F5344CB8AC3E}">
-        <p14:creationId xmlns:p14="http://schemas.microsoft.com/office/powerpoint/2010/main" val="3622560531"/>
+        <p14:creationId xmlns:p14="http://schemas.microsoft.com/office/powerpoint/2010/main" val="489771120"/>
       </p:ext>
     </p:extLst>
   </p:cSld>
@@ -2160,7 +2165,7 @@
           <a:p>
             <a:fld id="{6083BCA8-199F-2240-91E2-4F772E97A851}" type="datetimeFigureOut">
               <a:rPr lang="en-US" smtClean="0"/>
-              <a:t>7/30/22</a:t>
+              <a:t>11/19/22</a:t>
             </a:fld>
             <a:endParaRPr lang="en-US"/>
           </a:p>
@@ -2211,7 +2216,7 @@
     </p:spTree>
     <p:extLst>
       <p:ext uri="{BB962C8B-B14F-4D97-AF65-F5344CB8AC3E}">
-        <p14:creationId xmlns:p14="http://schemas.microsoft.com/office/powerpoint/2010/main" val="3494484943"/>
+        <p14:creationId xmlns:p14="http://schemas.microsoft.com/office/powerpoint/2010/main" val="336832823"/>
       </p:ext>
     </p:extLst>
   </p:cSld>
@@ -2255,7 +2260,7 @@
           <a:p>
             <a:fld id="{6083BCA8-199F-2240-91E2-4F772E97A851}" type="datetimeFigureOut">
               <a:rPr lang="en-US" smtClean="0"/>
-              <a:t>7/30/22</a:t>
+              <a:t>11/19/22</a:t>
             </a:fld>
             <a:endParaRPr lang="en-US"/>
           </a:p>
@@ -2306,7 +2311,7 @@
     </p:spTree>
     <p:extLst>
       <p:ext uri="{BB962C8B-B14F-4D97-AF65-F5344CB8AC3E}">
-        <p14:creationId xmlns:p14="http://schemas.microsoft.com/office/powerpoint/2010/main" val="731243859"/>
+        <p14:creationId xmlns:p14="http://schemas.microsoft.com/office/powerpoint/2010/main" val="3289256527"/>
       </p:ext>
     </p:extLst>
   </p:cSld>
@@ -2345,8 +2350,8 @@
         </p:nvSpPr>
         <p:spPr>
           <a:xfrm>
-            <a:off x="661333" y="853440"/>
-            <a:ext cx="3096637" cy="2987040"/>
+            <a:off x="661333" y="832802"/>
+            <a:ext cx="3096637" cy="2914809"/>
           </a:xfrm>
         </p:spPr>
         <p:txBody>
@@ -2377,8 +2382,8 @@
         </p:nvSpPr>
         <p:spPr>
           <a:xfrm>
-            <a:off x="4081760" y="1843196"/>
-            <a:ext cx="4860608" cy="9097433"/>
+            <a:off x="4081760" y="1798625"/>
+            <a:ext cx="4860608" cy="8877444"/>
           </a:xfrm>
         </p:spPr>
         <p:txBody>
@@ -2462,8 +2467,8 @@
         </p:nvSpPr>
         <p:spPr>
           <a:xfrm>
-            <a:off x="661333" y="3840480"/>
-            <a:ext cx="3096637" cy="7114964"/>
+            <a:off x="661333" y="3747611"/>
+            <a:ext cx="3096637" cy="6942914"/>
           </a:xfrm>
         </p:spPr>
         <p:txBody>
@@ -2532,7 +2537,7 @@
           <a:p>
             <a:fld id="{6083BCA8-199F-2240-91E2-4F772E97A851}" type="datetimeFigureOut">
               <a:rPr lang="en-US" smtClean="0"/>
-              <a:t>7/30/22</a:t>
+              <a:t>11/19/22</a:t>
             </a:fld>
             <a:endParaRPr lang="en-US"/>
           </a:p>
@@ -2583,7 +2588,7 @@
     </p:spTree>
     <p:extLst>
       <p:ext uri="{BB962C8B-B14F-4D97-AF65-F5344CB8AC3E}">
-        <p14:creationId xmlns:p14="http://schemas.microsoft.com/office/powerpoint/2010/main" val="2606912859"/>
+        <p14:creationId xmlns:p14="http://schemas.microsoft.com/office/powerpoint/2010/main" val="2841968449"/>
       </p:ext>
     </p:extLst>
   </p:cSld>
@@ -2622,8 +2627,8 @@
         </p:nvSpPr>
         <p:spPr>
           <a:xfrm>
-            <a:off x="661333" y="853440"/>
-            <a:ext cx="3096637" cy="2987040"/>
+            <a:off x="661333" y="832802"/>
+            <a:ext cx="3096637" cy="2914809"/>
           </a:xfrm>
         </p:spPr>
         <p:txBody>
@@ -2654,8 +2659,8 @@
         </p:nvSpPr>
         <p:spPr>
           <a:xfrm>
-            <a:off x="4081760" y="1843196"/>
-            <a:ext cx="4860608" cy="9097433"/>
+            <a:off x="4081760" y="1798625"/>
+            <a:ext cx="4860608" cy="8877444"/>
           </a:xfrm>
         </p:spPr>
         <p:txBody>
@@ -2719,8 +2724,8 @@
         </p:nvSpPr>
         <p:spPr>
           <a:xfrm>
-            <a:off x="661333" y="3840480"/>
-            <a:ext cx="3096637" cy="7114964"/>
+            <a:off x="661333" y="3747611"/>
+            <a:ext cx="3096637" cy="6942914"/>
           </a:xfrm>
         </p:spPr>
         <p:txBody>
@@ -2789,7 +2794,7 @@
           <a:p>
             <a:fld id="{6083BCA8-199F-2240-91E2-4F772E97A851}" type="datetimeFigureOut">
               <a:rPr lang="en-US" smtClean="0"/>
-              <a:t>7/30/22</a:t>
+              <a:t>11/19/22</a:t>
             </a:fld>
             <a:endParaRPr lang="en-US"/>
           </a:p>
@@ -2840,7 +2845,7 @@
     </p:spTree>
     <p:extLst>
       <p:ext uri="{BB962C8B-B14F-4D97-AF65-F5344CB8AC3E}">
-        <p14:creationId xmlns:p14="http://schemas.microsoft.com/office/powerpoint/2010/main" val="4127999729"/>
+        <p14:creationId xmlns:p14="http://schemas.microsoft.com/office/powerpoint/2010/main" val="402035975"/>
       </p:ext>
     </p:extLst>
   </p:cSld>
@@ -2884,8 +2889,8 @@
         </p:nvSpPr>
         <p:spPr>
           <a:xfrm>
-            <a:off x="660083" y="681570"/>
-            <a:ext cx="8281035" cy="2474384"/>
+            <a:off x="660083" y="665088"/>
+            <a:ext cx="8281035" cy="2414550"/>
           </a:xfrm>
           <a:prstGeom prst="rect">
             <a:avLst/>
@@ -2917,8 +2922,8 @@
         </p:nvSpPr>
         <p:spPr>
           <a:xfrm>
-            <a:off x="660083" y="3407833"/>
-            <a:ext cx="8281035" cy="8122498"/>
+            <a:off x="660083" y="3325427"/>
+            <a:ext cx="8281035" cy="7926083"/>
           </a:xfrm>
           <a:prstGeom prst="rect">
             <a:avLst/>
@@ -2979,8 +2984,8 @@
         </p:nvSpPr>
         <p:spPr>
           <a:xfrm>
-            <a:off x="660083" y="11865189"/>
-            <a:ext cx="2160270" cy="681567"/>
+            <a:off x="660083" y="11578271"/>
+            <a:ext cx="2160270" cy="665085"/>
           </a:xfrm>
           <a:prstGeom prst="rect">
             <a:avLst/>
@@ -3002,7 +3007,7 @@
           <a:p>
             <a:fld id="{6083BCA8-199F-2240-91E2-4F772E97A851}" type="datetimeFigureOut">
               <a:rPr lang="en-US" smtClean="0"/>
-              <a:t>7/30/22</a:t>
+              <a:t>11/19/22</a:t>
             </a:fld>
             <a:endParaRPr lang="en-US"/>
           </a:p>
@@ -3020,8 +3025,8 @@
         </p:nvSpPr>
         <p:spPr>
           <a:xfrm>
-            <a:off x="3180398" y="11865189"/>
-            <a:ext cx="3240405" cy="681567"/>
+            <a:off x="3180398" y="11578271"/>
+            <a:ext cx="3240405" cy="665085"/>
           </a:xfrm>
           <a:prstGeom prst="rect">
             <a:avLst/>
@@ -3057,8 +3062,8 @@
         </p:nvSpPr>
         <p:spPr>
           <a:xfrm>
-            <a:off x="6780848" y="11865189"/>
-            <a:ext cx="2160270" cy="681567"/>
+            <a:off x="6780848" y="11578271"/>
+            <a:ext cx="2160270" cy="665085"/>
           </a:xfrm>
           <a:prstGeom prst="rect">
             <a:avLst/>
@@ -3089,23 +3094,23 @@
     </p:spTree>
     <p:extLst>
       <p:ext uri="{BB962C8B-B14F-4D97-AF65-F5344CB8AC3E}">
-        <p14:creationId xmlns:p14="http://schemas.microsoft.com/office/powerpoint/2010/main" val="371430147"/>
+        <p14:creationId xmlns:p14="http://schemas.microsoft.com/office/powerpoint/2010/main" val="4242762474"/>
       </p:ext>
     </p:extLst>
   </p:cSld>
   <p:clrMap bg1="lt1" tx1="dk1" bg2="lt2" tx2="dk2" accent1="accent1" accent2="accent2" accent3="accent3" accent4="accent4" accent5="accent5" accent6="accent6" hlink="hlink" folHlink="folHlink"/>
   <p:sldLayoutIdLst>
-    <p:sldLayoutId id="2147483673" r:id="rId1"/>
-    <p:sldLayoutId id="2147483674" r:id="rId2"/>
-    <p:sldLayoutId id="2147483675" r:id="rId3"/>
-    <p:sldLayoutId id="2147483676" r:id="rId4"/>
-    <p:sldLayoutId id="2147483677" r:id="rId5"/>
-    <p:sldLayoutId id="2147483678" r:id="rId6"/>
-    <p:sldLayoutId id="2147483679" r:id="rId7"/>
-    <p:sldLayoutId id="2147483680" r:id="rId8"/>
-    <p:sldLayoutId id="2147483681" r:id="rId9"/>
-    <p:sldLayoutId id="2147483682" r:id="rId10"/>
-    <p:sldLayoutId id="2147483683" r:id="rId11"/>
+    <p:sldLayoutId id="2147483709" r:id="rId1"/>
+    <p:sldLayoutId id="2147483710" r:id="rId2"/>
+    <p:sldLayoutId id="2147483711" r:id="rId3"/>
+    <p:sldLayoutId id="2147483712" r:id="rId4"/>
+    <p:sldLayoutId id="2147483713" r:id="rId5"/>
+    <p:sldLayoutId id="2147483714" r:id="rId6"/>
+    <p:sldLayoutId id="2147483715" r:id="rId7"/>
+    <p:sldLayoutId id="2147483716" r:id="rId8"/>
+    <p:sldLayoutId id="2147483717" r:id="rId9"/>
+    <p:sldLayoutId id="2147483718" r:id="rId10"/>
+    <p:sldLayoutId id="2147483719" r:id="rId11"/>
   </p:sldLayoutIdLst>
   <p:txStyles>
     <p:titleStyle>
@@ -3421,8 +3426,8 @@
         </p:nvSpPr>
         <p:spPr>
           <a:xfrm>
-            <a:off x="3807242" y="3230"/>
-            <a:ext cx="1795142" cy="338554"/>
+            <a:off x="3648056" y="41989"/>
+            <a:ext cx="2458804" cy="338554"/>
           </a:xfrm>
           <a:prstGeom prst="rect">
             <a:avLst/>
@@ -3438,7 +3443,7 @@
             <a:pPr algn="ctr"/>
             <a:r>
               <a:rPr lang="en-US" sz="1600" b="1" dirty="0"/>
-              <a:t>Input data formats</a:t>
+              <a:t>Default input data formats</a:t>
             </a:r>
           </a:p>
         </p:txBody>
@@ -3458,13 +3463,13 @@
           <p:nvPr>
             <p:extLst>
               <p:ext uri="{D42A27DB-BD31-4B8C-83A1-F6EECF244321}">
-                <p14:modId xmlns:p14="http://schemas.microsoft.com/office/powerpoint/2010/main" val="3133579547"/>
+                <p14:modId xmlns:p14="http://schemas.microsoft.com/office/powerpoint/2010/main" val="3253788056"/>
               </p:ext>
             </p:extLst>
           </p:nvPr>
         </p:nvGraphicFramePr>
         <p:xfrm>
-          <a:off x="2331236" y="362832"/>
+          <a:off x="2331236" y="382219"/>
           <a:ext cx="4716000" cy="468632"/>
         </p:xfrm>
         <a:graphic>
@@ -3689,13 +3694,13 @@
           <p:nvPr>
             <p:extLst>
               <p:ext uri="{D42A27DB-BD31-4B8C-83A1-F6EECF244321}">
-                <p14:modId xmlns:p14="http://schemas.microsoft.com/office/powerpoint/2010/main" val="284401451"/>
+                <p14:modId xmlns:p14="http://schemas.microsoft.com/office/powerpoint/2010/main" val="3378671196"/>
               </p:ext>
             </p:extLst>
           </p:nvPr>
         </p:nvGraphicFramePr>
         <p:xfrm>
-          <a:off x="2331234" y="1414211"/>
+          <a:off x="2331234" y="1433598"/>
           <a:ext cx="4716000" cy="468632"/>
         </p:xfrm>
         <a:graphic>
@@ -3920,13 +3925,13 @@
           <p:nvPr>
             <p:extLst>
               <p:ext uri="{D42A27DB-BD31-4B8C-83A1-F6EECF244321}">
-                <p14:modId xmlns:p14="http://schemas.microsoft.com/office/powerpoint/2010/main" val="2658440047"/>
+                <p14:modId xmlns:p14="http://schemas.microsoft.com/office/powerpoint/2010/main" val="2191609046"/>
               </p:ext>
             </p:extLst>
           </p:nvPr>
         </p:nvGraphicFramePr>
         <p:xfrm>
-          <a:off x="2331234" y="889205"/>
+          <a:off x="2331234" y="908592"/>
           <a:ext cx="6876000" cy="468632"/>
         </p:xfrm>
         <a:graphic>
@@ -4259,13 +4264,13 @@
           <p:nvPr>
             <p:extLst>
               <p:ext uri="{D42A27DB-BD31-4B8C-83A1-F6EECF244321}">
-                <p14:modId xmlns:p14="http://schemas.microsoft.com/office/powerpoint/2010/main" val="3299871410"/>
+                <p14:modId xmlns:p14="http://schemas.microsoft.com/office/powerpoint/2010/main" val="576933916"/>
               </p:ext>
             </p:extLst>
           </p:nvPr>
         </p:nvGraphicFramePr>
         <p:xfrm>
-          <a:off x="2331234" y="1945468"/>
+          <a:off x="2331234" y="1964855"/>
           <a:ext cx="6156000" cy="468632"/>
         </p:xfrm>
         <a:graphic>
@@ -4561,10 +4566,10 @@
         </p:nvGrpSpPr>
         <p:grpSpPr>
           <a:xfrm>
-            <a:off x="99153" y="443940"/>
-            <a:ext cx="1666898" cy="1864253"/>
+            <a:off x="99158" y="463332"/>
+            <a:ext cx="1666899" cy="1864253"/>
             <a:chOff x="1414392" y="148126"/>
-            <a:chExt cx="1666898" cy="1864253"/>
+            <a:chExt cx="1666899" cy="1864253"/>
           </a:xfrm>
         </p:grpSpPr>
         <p:sp>
@@ -4689,8 +4694,8 @@
           </p:nvSpPr>
           <p:spPr>
             <a:xfrm>
-              <a:off x="1813785" y="1735380"/>
-              <a:ext cx="1267505" cy="276999"/>
+              <a:off x="1503167" y="1735380"/>
+              <a:ext cx="1578124" cy="276999"/>
             </a:xfrm>
             <a:prstGeom prst="rect">
               <a:avLst/>
@@ -4706,7 +4711,7 @@
               <a:pPr algn="r"/>
               <a:r>
                 <a:rPr lang="en-US" sz="1200" b="1" dirty="0"/>
-                <a:t>GLS / Other</a:t>
+                <a:t>Geolocation / Other</a:t>
               </a:r>
             </a:p>
           </p:txBody>
@@ -4726,7 +4731,7 @@
         </p:nvGrpSpPr>
         <p:grpSpPr>
           <a:xfrm>
-            <a:off x="94426" y="2600833"/>
+            <a:off x="94431" y="2620225"/>
             <a:ext cx="9479801" cy="2180549"/>
             <a:chOff x="94426" y="2600833"/>
             <a:chExt cx="9479801" cy="2180549"/>
@@ -5290,7 +5295,7 @@
         </p:nvGrpSpPr>
         <p:grpSpPr>
           <a:xfrm>
-            <a:off x="94426" y="4891264"/>
+            <a:off x="94431" y="4910651"/>
             <a:ext cx="9415727" cy="2460520"/>
             <a:chOff x="94426" y="4891264"/>
             <a:chExt cx="9415727" cy="2460520"/>
@@ -5734,7 +5739,7 @@
         </p:nvSpPr>
         <p:spPr>
           <a:xfrm>
-            <a:off x="94426" y="49720"/>
+            <a:off x="94431" y="69111"/>
             <a:ext cx="9415729" cy="2476663"/>
           </a:xfrm>
           <a:prstGeom prst="roundRect">
@@ -5783,10 +5788,10 @@
         </p:nvGrpSpPr>
         <p:grpSpPr>
           <a:xfrm>
-            <a:off x="94426" y="9712570"/>
-            <a:ext cx="9469280" cy="3039309"/>
-            <a:chOff x="94426" y="9712570"/>
-            <a:chExt cx="9469280" cy="3039309"/>
+            <a:off x="94426" y="9731958"/>
+            <a:ext cx="9480784" cy="2726198"/>
+            <a:chOff x="94426" y="9712571"/>
+            <a:chExt cx="9480784" cy="2726198"/>
           </a:xfrm>
         </p:grpSpPr>
         <p:grpSp>
@@ -5803,10 +5808,10 @@
           </p:nvGrpSpPr>
           <p:grpSpPr>
             <a:xfrm>
-              <a:off x="281301" y="10017691"/>
-              <a:ext cx="3682720" cy="2519451"/>
-              <a:chOff x="282810" y="9727431"/>
-              <a:chExt cx="3682720" cy="2519451"/>
+              <a:off x="279790" y="9863825"/>
+              <a:ext cx="3682720" cy="2324405"/>
+              <a:chOff x="281299" y="9573565"/>
+              <a:chExt cx="3682720" cy="2324405"/>
             </a:xfrm>
           </p:grpSpPr>
           <p:sp>
@@ -5823,7 +5828,7 @@
             </p:nvSpPr>
             <p:spPr>
               <a:xfrm>
-                <a:off x="282810" y="10461778"/>
+                <a:off x="281299" y="10112866"/>
                 <a:ext cx="3682720" cy="1785104"/>
               </a:xfrm>
               <a:prstGeom prst="rect">
@@ -5886,19 +5891,8 @@
                     <a:latin typeface="Courier New" panose="02070309020205020404" pitchFamily="49" charset="0"/>
                     <a:cs typeface="Courier New" panose="02070309020205020404" pitchFamily="49" charset="0"/>
                   </a:rPr>
-                  <a:t>(s1, keep </a:t>
+                  <a:t>(s1, keep = 0.25)</a:t>
                 </a:r>
-                <a:r>
-                  <a:rPr lang="en-US" sz="1100" b="1">
-                    <a:latin typeface="Courier New" panose="02070309020205020404" pitchFamily="49" charset="0"/>
-                    <a:cs typeface="Courier New" panose="02070309020205020404" pitchFamily="49" charset="0"/>
-                  </a:rPr>
-                  <a:t>= 0.25)</a:t>
-                </a:r>
-                <a:endParaRPr lang="en-US" sz="1100" b="1" dirty="0">
-                  <a:latin typeface="Courier New" panose="02070309020205020404" pitchFamily="49" charset="0"/>
-                  <a:cs typeface="Courier New" panose="02070309020205020404" pitchFamily="49" charset="0"/>
-                </a:endParaRPr>
               </a:p>
               <a:p>
                 <a:endParaRPr lang="en-US" sz="1100" b="1" dirty="0">
@@ -5987,7 +5981,7 @@
             </p:nvSpPr>
             <p:spPr>
               <a:xfrm>
-                <a:off x="525369" y="9727431"/>
+                <a:off x="525368" y="9573565"/>
                 <a:ext cx="3194583" cy="338554"/>
               </a:xfrm>
               <a:prstGeom prst="rect">
@@ -6024,8 +6018,8 @@
           </p:nvSpPr>
           <p:spPr>
             <a:xfrm>
-              <a:off x="94426" y="9712570"/>
-              <a:ext cx="9415725" cy="3039309"/>
+              <a:off x="94426" y="9712571"/>
+              <a:ext cx="9415725" cy="2726198"/>
             </a:xfrm>
             <a:prstGeom prst="roundRect">
               <a:avLst>
@@ -6073,9 +6067,9 @@
           </p:nvGrpSpPr>
           <p:grpSpPr>
             <a:xfrm>
-              <a:off x="3887458" y="10089589"/>
+              <a:off x="3898962" y="9839190"/>
               <a:ext cx="5676248" cy="2497055"/>
-              <a:chOff x="3887458" y="10089589"/>
+              <a:chOff x="3898962" y="9839190"/>
               <a:chExt cx="5676248" cy="2497055"/>
             </a:xfrm>
           </p:grpSpPr>
@@ -6093,9 +6087,9 @@
             </p:nvGrpSpPr>
             <p:grpSpPr>
               <a:xfrm>
-                <a:off x="3887458" y="10089589"/>
+                <a:off x="3898962" y="9839190"/>
                 <a:ext cx="1980000" cy="2495379"/>
-                <a:chOff x="3887458" y="10089589"/>
+                <a:chOff x="3898962" y="9839190"/>
                 <a:chExt cx="1980000" cy="2495379"/>
               </a:xfrm>
             </p:grpSpPr>
@@ -6113,7 +6107,7 @@
               </p:nvSpPr>
               <p:spPr>
                 <a:xfrm>
-                  <a:off x="4013252" y="10089589"/>
+                  <a:off x="4024756" y="9839190"/>
                   <a:ext cx="1589132" cy="276999"/>
                 </a:xfrm>
                 <a:prstGeom prst="rect">
@@ -6157,7 +6151,7 @@
               </p:blipFill>
               <p:spPr>
                 <a:xfrm>
-                  <a:off x="3887458" y="10604968"/>
+                  <a:off x="3898962" y="10354569"/>
                   <a:ext cx="1980000" cy="1980000"/>
                 </a:xfrm>
                 <a:prstGeom prst="rect">
@@ -6183,9 +6177,9 @@
             </p:nvGrpSpPr>
             <p:grpSpPr>
               <a:xfrm>
-                <a:off x="5618608" y="10089589"/>
+                <a:off x="5630112" y="9839190"/>
                 <a:ext cx="2042017" cy="2495379"/>
-                <a:chOff x="5618608" y="10089589"/>
+                <a:chOff x="5630112" y="9839190"/>
                 <a:chExt cx="2042017" cy="2495379"/>
               </a:xfrm>
             </p:grpSpPr>
@@ -6211,7 +6205,7 @@
               </p:blipFill>
               <p:spPr>
                 <a:xfrm>
-                  <a:off x="5649617" y="10604968"/>
+                  <a:off x="5661121" y="10354569"/>
                   <a:ext cx="1980000" cy="1980000"/>
                 </a:xfrm>
                 <a:prstGeom prst="rect">
@@ -6236,7 +6230,7 @@
               </p:nvSpPr>
               <p:spPr>
                 <a:xfrm>
-                  <a:off x="5618608" y="10089589"/>
+                  <a:off x="5630112" y="9839190"/>
                   <a:ext cx="2042017" cy="461665"/>
                 </a:xfrm>
                 <a:prstGeom prst="rect">
@@ -6280,9 +6274,9 @@
             </p:nvGrpSpPr>
             <p:grpSpPr>
               <a:xfrm>
-                <a:off x="7333159" y="10089589"/>
+                <a:off x="7344663" y="9839190"/>
                 <a:ext cx="2230547" cy="2497055"/>
-                <a:chOff x="7333159" y="10089589"/>
+                <a:chOff x="7344663" y="9839190"/>
                 <a:chExt cx="2230547" cy="2497055"/>
               </a:xfrm>
             </p:grpSpPr>
@@ -6308,7 +6302,7 @@
               </p:blipFill>
               <p:spPr>
                 <a:xfrm>
-                  <a:off x="7458433" y="10606644"/>
+                  <a:off x="7469937" y="10356245"/>
                   <a:ext cx="1980000" cy="1980000"/>
                 </a:xfrm>
                 <a:prstGeom prst="rect">
@@ -6333,7 +6327,7 @@
               </p:nvSpPr>
               <p:spPr>
                 <a:xfrm>
-                  <a:off x="7333159" y="10089589"/>
+                  <a:off x="7344663" y="9839190"/>
                   <a:ext cx="2230547" cy="461665"/>
                 </a:xfrm>
                 <a:prstGeom prst="rect">
@@ -6382,7 +6376,7 @@
         </p:nvGrpSpPr>
         <p:grpSpPr>
           <a:xfrm>
-            <a:off x="94427" y="7449243"/>
+            <a:off x="94427" y="7468635"/>
             <a:ext cx="9415726" cy="2175439"/>
             <a:chOff x="94427" y="7449243"/>
             <a:chExt cx="9415726" cy="2175439"/>

</xml_diff>